<commit_message>
Presentation corrected and changed my part a bit
</commit_message>
<xml_diff>
--- a/presentation/Presentation.pptx
+++ b/presentation/Presentation.pptx
@@ -10,8 +10,8 @@
   <p:sldIdLst>
     <p:sldId id="256" r:id="rId2"/>
     <p:sldId id="257" r:id="rId3"/>
-    <p:sldId id="263" r:id="rId4"/>
-    <p:sldId id="276" r:id="rId5"/>
+    <p:sldId id="276" r:id="rId4"/>
+    <p:sldId id="263" r:id="rId5"/>
     <p:sldId id="278" r:id="rId6"/>
     <p:sldId id="258" r:id="rId7"/>
     <p:sldId id="259" r:id="rId8"/>
@@ -215,6 +215,7 @@
           <a:p>
             <a:fld id="{07362B95-C662-41FF-9568-06DA4A6A60C9}" type="datetimeFigureOut">
               <a:rPr lang="de-CH" smtClean="0"/>
+              <a:pPr/>
               <a:t>18.12.2012</a:t>
             </a:fld>
             <a:endParaRPr lang="de-CH"/>
@@ -376,6 +377,7 @@
           <a:p>
             <a:fld id="{BAAA3D3A-D023-45E8-8EA3-7B1A54BA81CA}" type="slidenum">
               <a:rPr lang="de-CH" smtClean="0"/>
+              <a:pPr/>
               <a:t>‹Nr.›</a:t>
             </a:fld>
             <a:endParaRPr lang="de-CH"/>
@@ -385,7 +387,7 @@
     </p:spTree>
     <p:extLst>
       <p:ext uri="{BB962C8B-B14F-4D97-AF65-F5344CB8AC3E}">
-        <p14:creationId xmlns:p14="http://schemas.microsoft.com/office/powerpoint/2010/main" val="624665701"/>
+        <p14:creationId xmlns:p14="http://schemas.microsoft.com/office/powerpoint/2010/main" xmlns="" val="624665701"/>
       </p:ext>
     </p:extLst>
   </p:cSld>
@@ -560,6 +562,7 @@
           <a:p>
             <a:fld id="{BAAA3D3A-D023-45E8-8EA3-7B1A54BA81CA}" type="slidenum">
               <a:rPr lang="de-CH" smtClean="0"/>
+              <a:pPr/>
               <a:t>1</a:t>
             </a:fld>
             <a:endParaRPr lang="de-CH"/>
@@ -647,6 +650,7 @@
           <a:p>
             <a:fld id="{BAAA3D3A-D023-45E8-8EA3-7B1A54BA81CA}" type="slidenum">
               <a:rPr lang="de-CH" smtClean="0"/>
+              <a:pPr/>
               <a:t>10</a:t>
             </a:fld>
             <a:endParaRPr lang="de-CH"/>
@@ -656,7 +660,7 @@
     </p:spTree>
     <p:extLst>
       <p:ext uri="{BB962C8B-B14F-4D97-AF65-F5344CB8AC3E}">
-        <p14:creationId xmlns:p14="http://schemas.microsoft.com/office/powerpoint/2010/main" val="282664730"/>
+        <p14:creationId xmlns:p14="http://schemas.microsoft.com/office/powerpoint/2010/main" xmlns="" val="282664730"/>
       </p:ext>
     </p:extLst>
   </p:cSld>
@@ -739,6 +743,7 @@
           <a:p>
             <a:fld id="{BAAA3D3A-D023-45E8-8EA3-7B1A54BA81CA}" type="slidenum">
               <a:rPr lang="de-CH" smtClean="0"/>
+              <a:pPr/>
               <a:t>11</a:t>
             </a:fld>
             <a:endParaRPr lang="de-CH"/>
@@ -748,7 +753,7 @@
     </p:spTree>
     <p:extLst>
       <p:ext uri="{BB962C8B-B14F-4D97-AF65-F5344CB8AC3E}">
-        <p14:creationId xmlns:p14="http://schemas.microsoft.com/office/powerpoint/2010/main" val="4061653966"/>
+        <p14:creationId xmlns:p14="http://schemas.microsoft.com/office/powerpoint/2010/main" xmlns="" val="4061653966"/>
       </p:ext>
     </p:extLst>
   </p:cSld>
@@ -891,6 +896,7 @@
           <a:p>
             <a:fld id="{BAAA3D3A-D023-45E8-8EA3-7B1A54BA81CA}" type="slidenum">
               <a:rPr lang="de-CH" smtClean="0"/>
+              <a:pPr/>
               <a:t>12</a:t>
             </a:fld>
             <a:endParaRPr lang="de-CH"/>
@@ -900,7 +906,7 @@
     </p:spTree>
     <p:extLst>
       <p:ext uri="{BB962C8B-B14F-4D97-AF65-F5344CB8AC3E}">
-        <p14:creationId xmlns:p14="http://schemas.microsoft.com/office/powerpoint/2010/main" val="324696021"/>
+        <p14:creationId xmlns:p14="http://schemas.microsoft.com/office/powerpoint/2010/main" xmlns="" val="324696021"/>
       </p:ext>
     </p:extLst>
   </p:cSld>
@@ -965,12 +971,12 @@
               <a:t> </a:t>
             </a:r>
             <a:r>
-              <a:rPr lang="de-CH" dirty="0" err="1" smtClean="0"/>
-              <a:t>bild</a:t>
-            </a:r>
-            <a:r>
-              <a:rPr lang="de-CH" dirty="0" smtClean="0"/>
-              <a:t> erstellen</a:t>
+              <a:rPr lang="de-CH" dirty="0" smtClean="0"/>
+              <a:t>Bild </a:t>
+            </a:r>
+            <a:r>
+              <a:rPr lang="de-CH" dirty="0" smtClean="0"/>
+              <a:t>erstellen</a:t>
             </a:r>
             <a:endParaRPr lang="de-CH" dirty="0"/>
           </a:p>
@@ -993,6 +999,7 @@
           <a:p>
             <a:fld id="{BAAA3D3A-D023-45E8-8EA3-7B1A54BA81CA}" type="slidenum">
               <a:rPr lang="de-CH" smtClean="0"/>
+              <a:pPr/>
               <a:t>13</a:t>
             </a:fld>
             <a:endParaRPr lang="de-CH"/>
@@ -1082,6 +1089,7 @@
           <a:p>
             <a:fld id="{BAAA3D3A-D023-45E8-8EA3-7B1A54BA81CA}" type="slidenum">
               <a:rPr lang="de-CH" smtClean="0"/>
+              <a:pPr/>
               <a:t>16</a:t>
             </a:fld>
             <a:endParaRPr lang="de-CH"/>
@@ -1144,11 +1152,31 @@
           <a:p>
             <a:r>
               <a:rPr lang="de-CH" dirty="0" smtClean="0"/>
-              <a:t>Mosi: Testreihen zeigen, eine ausführlich (Gangbreite),</a:t>
+              <a:t>Mosi: Testreihen zeigen, eine </a:t>
+            </a:r>
+            <a:r>
+              <a:rPr lang="de-CH" dirty="0" smtClean="0"/>
+              <a:t>genauer</a:t>
             </a:r>
             <a:r>
               <a:rPr lang="de-CH" baseline="0" dirty="0" smtClean="0"/>
-              <a:t> Rest gar nicht - kurz</a:t>
+              <a:t> </a:t>
+            </a:r>
+            <a:r>
+              <a:rPr lang="de-CH" dirty="0" smtClean="0"/>
+              <a:t>(Gangbreite</a:t>
+            </a:r>
+            <a:r>
+              <a:rPr lang="de-CH" dirty="0" smtClean="0"/>
+              <a:t>),</a:t>
+            </a:r>
+            <a:r>
+              <a:rPr lang="de-CH" baseline="0" dirty="0" smtClean="0"/>
+              <a:t> Rest </a:t>
+            </a:r>
+            <a:r>
+              <a:rPr lang="de-CH" baseline="0" dirty="0" smtClean="0"/>
+              <a:t>nur kurz ansprechen</a:t>
             </a:r>
             <a:endParaRPr lang="de-CH" dirty="0"/>
           </a:p>
@@ -1171,6 +1199,7 @@
           <a:p>
             <a:fld id="{BAAA3D3A-D023-45E8-8EA3-7B1A54BA81CA}" type="slidenum">
               <a:rPr lang="de-CH" smtClean="0"/>
+              <a:pPr/>
               <a:t>17</a:t>
             </a:fld>
             <a:endParaRPr lang="de-CH"/>
@@ -1268,6 +1297,7 @@
           <a:p>
             <a:fld id="{BAAA3D3A-D023-45E8-8EA3-7B1A54BA81CA}" type="slidenum">
               <a:rPr lang="de-CH" smtClean="0"/>
+              <a:pPr/>
               <a:t>20</a:t>
             </a:fld>
             <a:endParaRPr lang="de-CH"/>
@@ -1338,26 +1368,15 @@
             </a:r>
             <a:r>
               <a:rPr lang="de-CH" baseline="0" dirty="0" err="1" smtClean="0"/>
-              <a:t>obwohl</a:t>
-            </a:r>
-            <a:r>
-              <a:rPr lang="de-CH" sz="1200" kern="1200" dirty="0" err="1" smtClean="0">
-                <a:solidFill>
-                  <a:schemeClr val="tx1"/>
-                </a:solidFill>
-                <a:latin typeface="+mn-lt"/>
-                <a:ea typeface="+mn-ea"/>
-                <a:cs typeface="+mn-cs"/>
-              </a:rPr>
-              <a:t>‘</a:t>
-            </a:r>
-            <a:r>
-              <a:rPr lang="de-CH" baseline="0" dirty="0" err="1" smtClean="0"/>
-              <a:t>s</a:t>
+              <a:t>obwohls</a:t>
             </a:r>
             <a:r>
               <a:rPr lang="de-CH" baseline="0" dirty="0" smtClean="0"/>
-              <a:t> seine Grenzen (</a:t>
+              <a:t> </a:t>
+            </a:r>
+            <a:r>
+              <a:rPr lang="de-CH" baseline="0" dirty="0" smtClean="0"/>
+              <a:t>seine Grenzen (</a:t>
             </a:r>
             <a:r>
               <a:rPr lang="de-CH" baseline="0" dirty="0" err="1" smtClean="0"/>
@@ -1388,6 +1407,7 @@
           <a:p>
             <a:fld id="{BAAA3D3A-D023-45E8-8EA3-7B1A54BA81CA}" type="slidenum">
               <a:rPr lang="de-CH" smtClean="0"/>
+              <a:pPr/>
               <a:t>23</a:t>
             </a:fld>
             <a:endParaRPr lang="de-CH"/>
@@ -1473,6 +1493,7 @@
           <a:p>
             <a:fld id="{BAAA3D3A-D023-45E8-8EA3-7B1A54BA81CA}" type="slidenum">
               <a:rPr lang="de-CH" smtClean="0"/>
+              <a:pPr/>
               <a:t>24</a:t>
             </a:fld>
             <a:endParaRPr lang="de-CH"/>
@@ -1539,9 +1560,12 @@
             </a:r>
             <a:r>
               <a:rPr lang="de-CH" baseline="0" dirty="0" smtClean="0"/>
-              <a:t> ausschmücken</a:t>
-            </a:r>
-            <a:endParaRPr lang="de-CH" dirty="0"/>
+              <a:t> </a:t>
+            </a:r>
+            <a:r>
+              <a:rPr lang="de-CH" baseline="0" dirty="0" smtClean="0"/>
+              <a:t>ausschmücken, aber nicht allzu stark</a:t>
+            </a:r>
           </a:p>
         </p:txBody>
       </p:sp>
@@ -1562,6 +1586,7 @@
           <a:p>
             <a:fld id="{BAAA3D3A-D023-45E8-8EA3-7B1A54BA81CA}" type="slidenum">
               <a:rPr lang="de-CH" smtClean="0"/>
+              <a:pPr/>
               <a:t>2</a:t>
             </a:fld>
             <a:endParaRPr lang="de-CH"/>
@@ -1631,15 +1656,21 @@
               <a:t> </a:t>
             </a:r>
             <a:r>
-              <a:rPr lang="de-CH" baseline="0" dirty="0" err="1" smtClean="0"/>
-              <a:t>Idee&amp;Motivation</a:t>
-            </a:r>
-            <a:r>
               <a:rPr lang="de-CH" baseline="0" dirty="0" smtClean="0"/>
-              <a:t>, Grundidee - hier: Auslöser der Idee</a:t>
-            </a:r>
-          </a:p>
-          <a:p>
+              <a:t>Idee &amp; Motivation</a:t>
+            </a:r>
+            <a:r>
+              <a:rPr lang="de-CH" baseline="0" dirty="0" smtClean="0"/>
+              <a:t>, Grundidee – Überblick </a:t>
+            </a:r>
+            <a:r>
+              <a:rPr lang="de-CH" baseline="0" dirty="0" smtClean="0"/>
+              <a:t>Situation </a:t>
+            </a:r>
+            <a:r>
+              <a:rPr lang="de-CH" baseline="0" dirty="0" smtClean="0"/>
+              <a:t>„wovon rede ich“</a:t>
+            </a:r>
             <a:endParaRPr lang="de-CH" dirty="0"/>
           </a:p>
         </p:txBody>
@@ -1661,6 +1692,7 @@
           <a:p>
             <a:fld id="{BAAA3D3A-D023-45E8-8EA3-7B1A54BA81CA}" type="slidenum">
               <a:rPr lang="de-CH" smtClean="0"/>
+              <a:pPr/>
               <a:t>3</a:t>
             </a:fld>
             <a:endParaRPr lang="de-CH"/>
@@ -1730,21 +1762,15 @@
               <a:t> </a:t>
             </a:r>
             <a:r>
-              <a:rPr lang="de-CH" baseline="0" dirty="0" err="1" smtClean="0"/>
-              <a:t>Idee&amp;Motivation</a:t>
-            </a:r>
-            <a:r>
               <a:rPr lang="de-CH" baseline="0" dirty="0" smtClean="0"/>
-              <a:t>, Grundidee – Überblick </a:t>
-            </a:r>
-            <a:r>
-              <a:rPr lang="de-CH" baseline="0" dirty="0" err="1" smtClean="0"/>
-              <a:t>situation</a:t>
+              <a:t>Idee &amp; Motivation</a:t>
             </a:r>
             <a:r>
               <a:rPr lang="de-CH" baseline="0" dirty="0" smtClean="0"/>
-              <a:t> „wovon rede ich“</a:t>
-            </a:r>
+              <a:t>, Grundidee - hier: Auslöser der Idee</a:t>
+            </a:r>
+          </a:p>
+          <a:p>
             <a:endParaRPr lang="de-CH" dirty="0"/>
           </a:p>
         </p:txBody>
@@ -1766,6 +1792,7 @@
           <a:p>
             <a:fld id="{BAAA3D3A-D023-45E8-8EA3-7B1A54BA81CA}" type="slidenum">
               <a:rPr lang="de-CH" smtClean="0"/>
+              <a:pPr/>
               <a:t>4</a:t>
             </a:fld>
             <a:endParaRPr lang="de-CH"/>
@@ -1852,24 +1879,24 @@
               <a:t> </a:t>
             </a:r>
             <a:r>
-              <a:rPr lang="de-CH" baseline="0" dirty="0" err="1" smtClean="0"/>
-              <a:t>Idee&amp;Motivation</a:t>
+              <a:rPr lang="de-CH" baseline="0" dirty="0" smtClean="0"/>
+              <a:t>Idee &amp; Motivation</a:t>
             </a:r>
             <a:r>
               <a:rPr lang="de-CH" baseline="0" dirty="0" smtClean="0"/>
               <a:t>, Grundidee – Was ist speziell an unserem </a:t>
             </a:r>
             <a:r>
-              <a:rPr lang="de-CH" baseline="0" dirty="0" err="1" smtClean="0"/>
-              <a:t>modell</a:t>
+              <a:rPr lang="de-CH" baseline="0" dirty="0" smtClean="0"/>
+              <a:t>Modell</a:t>
             </a:r>
             <a:r>
               <a:rPr lang="de-CH" baseline="0" dirty="0" smtClean="0"/>
               <a:t>, unseren </a:t>
             </a:r>
             <a:r>
-              <a:rPr lang="de-CH" baseline="0" dirty="0" err="1" smtClean="0"/>
-              <a:t>ideen</a:t>
+              <a:rPr lang="de-CH" baseline="0" dirty="0" smtClean="0"/>
+              <a:t>Ideen</a:t>
             </a:r>
             <a:r>
               <a:rPr lang="de-CH" baseline="0" dirty="0" smtClean="0"/>
@@ -1896,6 +1923,7 @@
           <a:p>
             <a:fld id="{BAAA3D3A-D023-45E8-8EA3-7B1A54BA81CA}" type="slidenum">
               <a:rPr lang="de-CH" smtClean="0"/>
+              <a:pPr/>
               <a:t>5</a:t>
             </a:fld>
             <a:endParaRPr lang="de-CH"/>
@@ -1991,6 +2019,7 @@
           <a:p>
             <a:fld id="{BAAA3D3A-D023-45E8-8EA3-7B1A54BA81CA}" type="slidenum">
               <a:rPr lang="de-CH" smtClean="0"/>
+              <a:pPr/>
               <a:t>6</a:t>
             </a:fld>
             <a:endParaRPr lang="de-CH"/>
@@ -2078,6 +2107,7 @@
           <a:p>
             <a:fld id="{BAAA3D3A-D023-45E8-8EA3-7B1A54BA81CA}" type="slidenum">
               <a:rPr lang="de-CH" smtClean="0"/>
+              <a:pPr/>
               <a:t>7</a:t>
             </a:fld>
             <a:endParaRPr lang="de-CH"/>
@@ -2087,7 +2117,7 @@
     </p:spTree>
     <p:extLst>
       <p:ext uri="{BB962C8B-B14F-4D97-AF65-F5344CB8AC3E}">
-        <p14:creationId xmlns:p14="http://schemas.microsoft.com/office/powerpoint/2010/main" val="1419291677"/>
+        <p14:creationId xmlns:p14="http://schemas.microsoft.com/office/powerpoint/2010/main" xmlns="" val="1419291677"/>
       </p:ext>
     </p:extLst>
   </p:cSld>
@@ -2170,6 +2200,7 @@
           <a:p>
             <a:fld id="{BAAA3D3A-D023-45E8-8EA3-7B1A54BA81CA}" type="slidenum">
               <a:rPr lang="de-CH" smtClean="0"/>
+              <a:pPr/>
               <a:t>8</a:t>
             </a:fld>
             <a:endParaRPr lang="de-CH"/>
@@ -2179,7 +2210,7 @@
     </p:spTree>
     <p:extLst>
       <p:ext uri="{BB962C8B-B14F-4D97-AF65-F5344CB8AC3E}">
-        <p14:creationId xmlns:p14="http://schemas.microsoft.com/office/powerpoint/2010/main" val="1364280645"/>
+        <p14:creationId xmlns:p14="http://schemas.microsoft.com/office/powerpoint/2010/main" xmlns="" val="1364280645"/>
       </p:ext>
     </p:extLst>
   </p:cSld>
@@ -2261,6 +2292,7 @@
           <a:p>
             <a:fld id="{BAAA3D3A-D023-45E8-8EA3-7B1A54BA81CA}" type="slidenum">
               <a:rPr lang="de-CH" smtClean="0"/>
+              <a:pPr/>
               <a:t>9</a:t>
             </a:fld>
             <a:endParaRPr lang="de-CH"/>
@@ -2270,7 +2302,7 @@
     </p:spTree>
     <p:extLst>
       <p:ext uri="{BB962C8B-B14F-4D97-AF65-F5344CB8AC3E}">
-        <p14:creationId xmlns:p14="http://schemas.microsoft.com/office/powerpoint/2010/main" val="2930191362"/>
+        <p14:creationId xmlns:p14="http://schemas.microsoft.com/office/powerpoint/2010/main" xmlns="" val="2930191362"/>
       </p:ext>
     </p:extLst>
   </p:cSld>
@@ -6116,7 +6148,9 @@
           </a:xfrm>
         </p:spPr>
         <p:txBody>
-          <a:bodyPr/>
+          <a:bodyPr>
+            <a:normAutofit/>
+          </a:bodyPr>
           <a:lstStyle/>
           <a:p>
             <a:r>
@@ -6141,11 +6175,15 @@
               <a:rPr lang="de-CH" dirty="0" smtClean="0"/>
             </a:br>
             <a:r>
-              <a:rPr lang="de-CH" dirty="0" smtClean="0"/>
+              <a:rPr lang="de-CH" sz="2300" dirty="0" smtClean="0"/>
+              <a:t>https://github.com/ratheile/msssm</a:t>
+            </a:r>
+            <a:r>
+              <a:rPr lang="de-CH" sz="2000" dirty="0" smtClean="0"/>
               <a:t/>
             </a:r>
             <a:br>
-              <a:rPr lang="de-CH" dirty="0" smtClean="0"/>
+              <a:rPr lang="de-CH" sz="2000" dirty="0" smtClean="0"/>
             </a:br>
             <a:r>
               <a:rPr lang="de-CH" dirty="0" smtClean="0"/>
@@ -6304,7 +6342,7 @@
           <a:blip r:embed="rId3" cstate="print">
             <a:extLst>
               <a:ext uri="{28A0092B-C50C-407E-A947-70E740481C1C}">
-                <a14:useLocalDpi xmlns:a14="http://schemas.microsoft.com/office/drawing/2010/main" val="0"/>
+                <a14:useLocalDpi xmlns:a14="http://schemas.microsoft.com/office/drawing/2010/main" xmlns="" val="0"/>
               </a:ext>
             </a:extLst>
           </a:blip>
@@ -6328,14 +6366,14 @@
           <a:effectLst/>
           <a:extLst>
             <a:ext uri="{909E8E84-426E-40DD-AFC4-6F175D3DCCD1}">
-              <a14:hiddenFill xmlns:a14="http://schemas.microsoft.com/office/drawing/2010/main">
+              <a14:hiddenFill xmlns:a14="http://schemas.microsoft.com/office/drawing/2010/main" xmlns="">
                 <a:solidFill>
                   <a:schemeClr val="accent1"/>
                 </a:solidFill>
               </a14:hiddenFill>
             </a:ext>
             <a:ext uri="{91240B29-F687-4F45-9708-019B960494DF}">
-              <a14:hiddenLine xmlns:a14="http://schemas.microsoft.com/office/drawing/2010/main" w="9525">
+              <a14:hiddenLine xmlns:a14="http://schemas.microsoft.com/office/drawing/2010/main" xmlns="" w="9525">
                 <a:solidFill>
                   <a:schemeClr val="tx1"/>
                 </a:solidFill>
@@ -6345,7 +6383,7 @@
               </a14:hiddenLine>
             </a:ext>
             <a:ext uri="{AF507438-7753-43E0-B8FC-AC1667EBCBE1}">
-              <a14:hiddenEffects xmlns:a14="http://schemas.microsoft.com/office/drawing/2010/main">
+              <a14:hiddenEffects xmlns:a14="http://schemas.microsoft.com/office/drawing/2010/main" xmlns="">
                 <a:effectLst>
                   <a:outerShdw dist="35921" dir="2700000" algn="ctr" rotWithShape="0">
                     <a:schemeClr val="bg2"/>
@@ -6368,7 +6406,7 @@
           <a:blip r:embed="rId4" cstate="print">
             <a:extLst>
               <a:ext uri="{28A0092B-C50C-407E-A947-70E740481C1C}">
-                <a14:useLocalDpi xmlns:a14="http://schemas.microsoft.com/office/drawing/2010/main" val="0"/>
+                <a14:useLocalDpi xmlns:a14="http://schemas.microsoft.com/office/drawing/2010/main" xmlns="" val="0"/>
               </a:ext>
             </a:extLst>
           </a:blip>
@@ -6388,7 +6426,7 @@
           <a:noFill/>
           <a:extLst>
             <a:ext uri="{909E8E84-426E-40DD-AFC4-6F175D3DCCD1}">
-              <a14:hiddenFill xmlns:a14="http://schemas.microsoft.com/office/drawing/2010/main">
+              <a14:hiddenFill xmlns:a14="http://schemas.microsoft.com/office/drawing/2010/main" xmlns="">
                 <a:solidFill>
                   <a:srgbClr val="FFFFFF"/>
                 </a:solidFill>
@@ -6529,7 +6567,7 @@
           <a:blip r:embed="rId3" cstate="print">
             <a:extLst>
               <a:ext uri="{28A0092B-C50C-407E-A947-70E740481C1C}">
-                <a14:useLocalDpi xmlns:a14="http://schemas.microsoft.com/office/drawing/2010/main" val="0"/>
+                <a14:useLocalDpi xmlns:a14="http://schemas.microsoft.com/office/drawing/2010/main" xmlns="" val="0"/>
               </a:ext>
             </a:extLst>
           </a:blip>
@@ -6553,14 +6591,14 @@
           <a:effectLst/>
           <a:extLst>
             <a:ext uri="{909E8E84-426E-40DD-AFC4-6F175D3DCCD1}">
-              <a14:hiddenFill xmlns:a14="http://schemas.microsoft.com/office/drawing/2010/main">
+              <a14:hiddenFill xmlns:a14="http://schemas.microsoft.com/office/drawing/2010/main" xmlns="">
                 <a:solidFill>
                   <a:schemeClr val="accent1"/>
                 </a:solidFill>
               </a14:hiddenFill>
             </a:ext>
             <a:ext uri="{91240B29-F687-4F45-9708-019B960494DF}">
-              <a14:hiddenLine xmlns:a14="http://schemas.microsoft.com/office/drawing/2010/main" w="9525">
+              <a14:hiddenLine xmlns:a14="http://schemas.microsoft.com/office/drawing/2010/main" xmlns="" w="9525">
                 <a:solidFill>
                   <a:schemeClr val="tx1"/>
                 </a:solidFill>
@@ -6570,7 +6608,7 @@
               </a14:hiddenLine>
             </a:ext>
             <a:ext uri="{AF507438-7753-43E0-B8FC-AC1667EBCBE1}">
-              <a14:hiddenEffects xmlns:a14="http://schemas.microsoft.com/office/drawing/2010/main">
+              <a14:hiddenEffects xmlns:a14="http://schemas.microsoft.com/office/drawing/2010/main" xmlns="">
                 <a:effectLst>
                   <a:outerShdw dist="35921" dir="2700000" algn="ctr" rotWithShape="0">
                     <a:schemeClr val="bg2"/>
@@ -6593,7 +6631,7 @@
           <a:blip r:embed="rId4" cstate="print">
             <a:extLst>
               <a:ext uri="{28A0092B-C50C-407E-A947-70E740481C1C}">
-                <a14:useLocalDpi xmlns:a14="http://schemas.microsoft.com/office/drawing/2010/main" val="0"/>
+                <a14:useLocalDpi xmlns:a14="http://schemas.microsoft.com/office/drawing/2010/main" xmlns="" val="0"/>
               </a:ext>
             </a:extLst>
           </a:blip>
@@ -6613,7 +6651,7 @@
           <a:noFill/>
           <a:extLst>
             <a:ext uri="{909E8E84-426E-40DD-AFC4-6F175D3DCCD1}">
-              <a14:hiddenFill xmlns:a14="http://schemas.microsoft.com/office/drawing/2010/main">
+              <a14:hiddenFill xmlns:a14="http://schemas.microsoft.com/office/drawing/2010/main" xmlns="">
                 <a:solidFill>
                   <a:srgbClr val="FFFFFF"/>
                 </a:solidFill>
@@ -6947,42 +6985,39 @@
         <p:spPr/>
         <p:txBody>
           <a:bodyPr>
-            <a:normAutofit fontScale="90000"/>
+            <a:noAutofit/>
           </a:bodyPr>
           <a:lstStyle/>
           <a:p>
             <a:r>
-              <a:rPr lang="de-CH" dirty="0" smtClean="0"/>
-              <a:t>Realisation:</a:t>
-            </a:r>
-            <a:br>
-              <a:rPr lang="de-CH" dirty="0" smtClean="0"/>
-            </a:br>
-            <a:r>
-              <a:rPr lang="de-CH" dirty="0" smtClean="0"/>
-              <a:t>Drawing </a:t>
-            </a:r>
-            <a:r>
-              <a:rPr lang="de-CH" dirty="0" err="1" smtClean="0"/>
+              <a:rPr lang="de-CH" sz="4250" dirty="0" smtClean="0"/>
+              <a:t>Realisation</a:t>
+            </a:r>
+            <a:r>
+              <a:rPr lang="de-CH" sz="4250" dirty="0" smtClean="0"/>
+              <a:t>: Drawing </a:t>
+            </a:r>
+            <a:r>
+              <a:rPr lang="de-CH" sz="4250" dirty="0" err="1" smtClean="0"/>
               <a:t>of</a:t>
             </a:r>
             <a:r>
-              <a:rPr lang="de-CH" dirty="0" smtClean="0"/>
-              <a:t> </a:t>
-            </a:r>
-            <a:r>
-              <a:rPr lang="de-CH" dirty="0" err="1" smtClean="0"/>
+              <a:rPr lang="de-CH" sz="4250" dirty="0" smtClean="0"/>
+              <a:t> </a:t>
+            </a:r>
+            <a:r>
+              <a:rPr lang="de-CH" sz="4250" dirty="0" err="1" smtClean="0"/>
               <a:t>field</a:t>
             </a:r>
             <a:r>
-              <a:rPr lang="de-CH" dirty="0" smtClean="0"/>
+              <a:rPr lang="de-CH" sz="4250" dirty="0" smtClean="0"/>
               <a:t> &amp; </a:t>
             </a:r>
             <a:r>
-              <a:rPr lang="de-CH" dirty="0" err="1" smtClean="0"/>
+              <a:rPr lang="de-CH" sz="4250" dirty="0" err="1" smtClean="0"/>
               <a:t>agents</a:t>
             </a:r>
-            <a:endParaRPr lang="de-CH" dirty="0"/>
+            <a:endParaRPr lang="de-CH" sz="4250" dirty="0"/>
           </a:p>
         </p:txBody>
       </p:sp>
@@ -7079,10 +7114,10 @@
           <p:nvPr/>
         </p:nvPicPr>
         <p:blipFill>
-          <a:blip r:embed="rId3">
+          <a:blip r:embed="rId3" cstate="print">
             <a:extLst>
               <a:ext uri="{28A0092B-C50C-407E-A947-70E740481C1C}">
-                <a14:useLocalDpi xmlns:a14="http://schemas.microsoft.com/office/drawing/2010/main" val="0"/>
+                <a14:useLocalDpi xmlns:a14="http://schemas.microsoft.com/office/drawing/2010/main" xmlns="" val="0"/>
               </a:ext>
             </a:extLst>
           </a:blip>
@@ -7102,7 +7137,7 @@
           <a:noFill/>
           <a:extLst>
             <a:ext uri="{909E8E84-426E-40DD-AFC4-6F175D3DCCD1}">
-              <a14:hiddenFill xmlns:a14="http://schemas.microsoft.com/office/drawing/2010/main">
+              <a14:hiddenFill xmlns:a14="http://schemas.microsoft.com/office/drawing/2010/main" xmlns="">
                 <a:solidFill>
                   <a:srgbClr val="FFFFFF"/>
                 </a:solidFill>
@@ -7163,29 +7198,10 @@
               <a:t>Realisation: Class </a:t>
             </a:r>
             <a:r>
-              <a:rPr lang="de-CH" dirty="0" err="1" smtClean="0"/>
+              <a:rPr lang="en-US" dirty="0" smtClean="0"/>
               <a:t>Diagram</a:t>
             </a:r>
-            <a:endParaRPr lang="de-CH" dirty="0"/>
-          </a:p>
-        </p:txBody>
-      </p:sp>
-      <p:sp>
-        <p:nvSpPr>
-          <p:cNvPr id="3" name="Inhaltsplatzhalter 2"/>
-          <p:cNvSpPr>
-            <a:spLocks noGrp="1"/>
-          </p:cNvSpPr>
-          <p:nvPr>
-            <p:ph idx="1"/>
-          </p:nvPr>
-        </p:nvSpPr>
-        <p:spPr/>
-        <p:txBody>
-          <a:bodyPr/>
-          <a:lstStyle/>
-          <a:p>
-            <a:endParaRPr lang="de-CH" dirty="0"/>
+            <a:endParaRPr lang="en-US" dirty="0"/>
           </a:p>
         </p:txBody>
       </p:sp>
@@ -7198,10 +7214,10 @@
           <p:nvPr/>
         </p:nvPicPr>
         <p:blipFill>
-          <a:blip r:embed="rId2">
+          <a:blip r:embed="rId2" cstate="print">
             <a:extLst>
               <a:ext uri="{28A0092B-C50C-407E-A947-70E740481C1C}">
-                <a14:useLocalDpi xmlns:a14="http://schemas.microsoft.com/office/drawing/2010/main" val="0"/>
+                <a14:useLocalDpi xmlns:a14="http://schemas.microsoft.com/office/drawing/2010/main" xmlns="" val="0"/>
               </a:ext>
             </a:extLst>
           </a:blip>
@@ -7212,7 +7228,7 @@
         </p:blipFill>
         <p:spPr bwMode="auto">
           <a:xfrm>
-            <a:off x="323528" y="1844824"/>
+            <a:off x="1565511" y="1844824"/>
             <a:ext cx="6012978" cy="4604533"/>
           </a:xfrm>
           <a:prstGeom prst="rect">
@@ -7221,7 +7237,7 @@
           <a:noFill/>
           <a:extLst>
             <a:ext uri="{909E8E84-426E-40DD-AFC4-6F175D3DCCD1}">
-              <a14:hiddenFill xmlns:a14="http://schemas.microsoft.com/office/drawing/2010/main">
+              <a14:hiddenFill xmlns:a14="http://schemas.microsoft.com/office/drawing/2010/main" xmlns="">
                 <a:solidFill>
                   <a:srgbClr val="FFFFFF"/>
                 </a:solidFill>
@@ -7233,7 +7249,7 @@
     </p:spTree>
     <p:extLst>
       <p:ext uri="{BB962C8B-B14F-4D97-AF65-F5344CB8AC3E}">
-        <p14:creationId xmlns:p14="http://schemas.microsoft.com/office/powerpoint/2010/main" val="1616343719"/>
+        <p14:creationId xmlns:p14="http://schemas.microsoft.com/office/powerpoint/2010/main" xmlns="" val="1616343719"/>
       </p:ext>
     </p:extLst>
   </p:cSld>
@@ -7526,7 +7542,7 @@
             </a:r>
             <a:r>
               <a:rPr lang="de-CH" dirty="0" err="1" smtClean="0"/>
-              <a:t>its</a:t>
+              <a:t>it</a:t>
             </a:r>
             <a:endParaRPr lang="de-CH" dirty="0"/>
           </a:p>
@@ -8323,7 +8339,11 @@
           <a:p>
             <a:r>
               <a:rPr lang="en-US" dirty="0" smtClean="0"/>
-              <a:t>Introduction, motivation &amp; basic idea</a:t>
+              <a:t>Introduction &amp; </a:t>
+            </a:r>
+            <a:r>
+              <a:rPr lang="en-US" dirty="0" smtClean="0"/>
+              <a:t>basic idea</a:t>
             </a:r>
           </a:p>
           <a:p>
@@ -8440,7 +8460,7 @@
           <a:blip r:embed="rId3" cstate="print">
             <a:extLst>
               <a:ext uri="{28A0092B-C50C-407E-A947-70E740481C1C}">
-                <a14:useLocalDpi xmlns:a14="http://schemas.microsoft.com/office/drawing/2010/main" val="0"/>
+                <a14:useLocalDpi xmlns:a14="http://schemas.microsoft.com/office/drawing/2010/main" xmlns="" val="0"/>
               </a:ext>
             </a:extLst>
           </a:blip>
@@ -8460,7 +8480,7 @@
           <a:noFill/>
           <a:extLst>
             <a:ext uri="{909E8E84-426E-40DD-AFC4-6F175D3DCCD1}">
-              <a14:hiddenFill xmlns:a14="http://schemas.microsoft.com/office/drawing/2010/main">
+              <a14:hiddenFill xmlns:a14="http://schemas.microsoft.com/office/drawing/2010/main" xmlns="">
                 <a:solidFill>
                   <a:srgbClr val="FFFFFF"/>
                 </a:solidFill>
@@ -9499,7 +9519,7 @@
             </a:r>
             <a:r>
               <a:rPr lang="de-CH" dirty="0" err="1" smtClean="0"/>
-              <a:t>shapese</a:t>
+              <a:t>shapes</a:t>
             </a:r>
             <a:endParaRPr lang="de-CH" dirty="0" smtClean="0"/>
           </a:p>
@@ -9715,7 +9735,11 @@
           <a:p>
             <a:r>
               <a:rPr lang="en-US" dirty="0" smtClean="0"/>
-              <a:t>Intro, motivation &amp; basic idea</a:t>
+              <a:t>Introduction &amp; </a:t>
+            </a:r>
+            <a:r>
+              <a:rPr lang="en-US" dirty="0" smtClean="0"/>
+              <a:t>basic idea</a:t>
             </a:r>
             <a:endParaRPr lang="de-CH" dirty="0"/>
           </a:p>
@@ -9723,7 +9747,7 @@
       </p:sp>
       <p:pic>
         <p:nvPicPr>
-          <p:cNvPr id="1026" name="Picture 2" descr="C:\Users\Ueli\Desktop\oktoberfest2.jpg"/>
+          <p:cNvPr id="2050" name="Picture 2" descr="C:\Users\Ueli\Desktop\HBPlan.jpg"/>
           <p:cNvPicPr>
             <a:picLocks noChangeAspect="1" noChangeArrowheads="1"/>
           </p:cNvPicPr>
@@ -9738,8 +9762,8 @@
         </p:blipFill>
         <p:spPr bwMode="auto">
           <a:xfrm>
-            <a:off x="701570" y="2132856"/>
-            <a:ext cx="7740860" cy="4354234"/>
+            <a:off x="251520" y="2204864"/>
+            <a:ext cx="8587439" cy="3940036"/>
           </a:xfrm>
           <a:prstGeom prst="rect">
             <a:avLst/>
@@ -9747,6 +9771,36 @@
           <a:noFill/>
         </p:spPr>
       </p:pic>
+      <p:sp>
+        <p:nvSpPr>
+          <p:cNvPr id="4" name="Textfeld 3"/>
+          <p:cNvSpPr txBox="1"/>
+          <p:nvPr/>
+        </p:nvSpPr>
+        <p:spPr>
+          <a:xfrm>
+            <a:off x="7559824" y="6237312"/>
+            <a:ext cx="1584176" cy="369332"/>
+          </a:xfrm>
+          <a:prstGeom prst="rect">
+            <a:avLst/>
+          </a:prstGeom>
+          <a:noFill/>
+        </p:spPr>
+        <p:txBody>
+          <a:bodyPr wrap="square" rtlCol="0">
+            <a:spAutoFit/>
+          </a:bodyPr>
+          <a:lstStyle/>
+          <a:p>
+            <a:r>
+              <a:rPr lang="de-CH" dirty="0" smtClean="0"/>
+              <a:t>www.sbb.ch</a:t>
+            </a:r>
+            <a:endParaRPr lang="de-CH" dirty="0"/>
+          </a:p>
+        </p:txBody>
+      </p:sp>
     </p:spTree>
   </p:cSld>
   <p:clrMapOvr>
@@ -9798,7 +9852,11 @@
           <a:p>
             <a:r>
               <a:rPr lang="en-US" dirty="0" smtClean="0"/>
-              <a:t>Intro, motivation &amp; basic idea</a:t>
+              <a:t>Introduction &amp; </a:t>
+            </a:r>
+            <a:r>
+              <a:rPr lang="en-US" dirty="0" smtClean="0"/>
+              <a:t>basic idea</a:t>
             </a:r>
             <a:endParaRPr lang="de-CH" dirty="0"/>
           </a:p>
@@ -9806,7 +9864,7 @@
       </p:sp>
       <p:pic>
         <p:nvPicPr>
-          <p:cNvPr id="2050" name="Picture 2" descr="C:\Users\Ueli\Desktop\HBPlan.jpg"/>
+          <p:cNvPr id="1026" name="Picture 2" descr="C:\Users\Ueli\Desktop\oktoberfest2.jpg"/>
           <p:cNvPicPr>
             <a:picLocks noChangeAspect="1" noChangeArrowheads="1"/>
           </p:cNvPicPr>
@@ -9821,8 +9879,8 @@
         </p:blipFill>
         <p:spPr bwMode="auto">
           <a:xfrm>
-            <a:off x="251520" y="2204864"/>
-            <a:ext cx="8587439" cy="3940036"/>
+            <a:off x="701570" y="2132856"/>
+            <a:ext cx="7740860" cy="4354234"/>
           </a:xfrm>
           <a:prstGeom prst="rect">
             <a:avLst/>
@@ -10548,7 +10606,7 @@
           <a:blip r:embed="rId3" cstate="print">
             <a:extLst>
               <a:ext uri="{28A0092B-C50C-407E-A947-70E740481C1C}">
-                <a14:useLocalDpi xmlns:a14="http://schemas.microsoft.com/office/drawing/2010/main" val="0"/>
+                <a14:useLocalDpi xmlns:a14="http://schemas.microsoft.com/office/drawing/2010/main" xmlns="" val="0"/>
               </a:ext>
             </a:extLst>
           </a:blip>
@@ -10572,14 +10630,14 @@
           <a:effectLst/>
           <a:extLst>
             <a:ext uri="{909E8E84-426E-40DD-AFC4-6F175D3DCCD1}">
-              <a14:hiddenFill xmlns:a14="http://schemas.microsoft.com/office/drawing/2010/main">
+              <a14:hiddenFill xmlns:a14="http://schemas.microsoft.com/office/drawing/2010/main" xmlns="">
                 <a:solidFill>
                   <a:schemeClr val="accent1"/>
                 </a:solidFill>
               </a14:hiddenFill>
             </a:ext>
             <a:ext uri="{91240B29-F687-4F45-9708-019B960494DF}">
-              <a14:hiddenLine xmlns:a14="http://schemas.microsoft.com/office/drawing/2010/main" w="9525">
+              <a14:hiddenLine xmlns:a14="http://schemas.microsoft.com/office/drawing/2010/main" xmlns="" w="9525">
                 <a:solidFill>
                   <a:schemeClr val="tx1"/>
                 </a:solidFill>
@@ -10589,7 +10647,7 @@
               </a14:hiddenLine>
             </a:ext>
             <a:ext uri="{AF507438-7753-43E0-B8FC-AC1667EBCBE1}">
-              <a14:hiddenEffects xmlns:a14="http://schemas.microsoft.com/office/drawing/2010/main">
+              <a14:hiddenEffects xmlns:a14="http://schemas.microsoft.com/office/drawing/2010/main" xmlns="">
                 <a:effectLst>
                   <a:outerShdw dist="35921" dir="2700000" algn="ctr" rotWithShape="0">
                     <a:schemeClr val="bg2"/>
@@ -10769,7 +10827,7 @@
           <a:blip r:embed="rId4" cstate="print">
             <a:extLst>
               <a:ext uri="{28A0092B-C50C-407E-A947-70E740481C1C}">
-                <a14:useLocalDpi xmlns:a14="http://schemas.microsoft.com/office/drawing/2010/main" val="0"/>
+                <a14:useLocalDpi xmlns:a14="http://schemas.microsoft.com/office/drawing/2010/main" xmlns="" val="0"/>
               </a:ext>
             </a:extLst>
           </a:blip>
@@ -10789,7 +10847,7 @@
           <a:noFill/>
           <a:extLst>
             <a:ext uri="{909E8E84-426E-40DD-AFC4-6F175D3DCCD1}">
-              <a14:hiddenFill xmlns:a14="http://schemas.microsoft.com/office/drawing/2010/main">
+              <a14:hiddenFill xmlns:a14="http://schemas.microsoft.com/office/drawing/2010/main" xmlns="">
                 <a:solidFill>
                   <a:srgbClr val="FFFFFF"/>
                 </a:solidFill>
@@ -10810,7 +10868,7 @@
           <a:blip r:embed="rId5" cstate="print">
             <a:extLst>
               <a:ext uri="{28A0092B-C50C-407E-A947-70E740481C1C}">
-                <a14:useLocalDpi xmlns:a14="http://schemas.microsoft.com/office/drawing/2010/main" val="0"/>
+                <a14:useLocalDpi xmlns:a14="http://schemas.microsoft.com/office/drawing/2010/main" xmlns="" val="0"/>
               </a:ext>
             </a:extLst>
           </a:blip>
@@ -10830,7 +10888,7 @@
           <a:noFill/>
           <a:extLst>
             <a:ext uri="{909E8E84-426E-40DD-AFC4-6F175D3DCCD1}">
-              <a14:hiddenFill xmlns:a14="http://schemas.microsoft.com/office/drawing/2010/main">
+              <a14:hiddenFill xmlns:a14="http://schemas.microsoft.com/office/drawing/2010/main" xmlns="">
                 <a:solidFill>
                   <a:srgbClr val="FFFFFF"/>
                 </a:solidFill>
@@ -10969,7 +11027,7 @@
           <a:blip r:embed="rId3" cstate="print">
             <a:extLst>
               <a:ext uri="{28A0092B-C50C-407E-A947-70E740481C1C}">
-                <a14:useLocalDpi xmlns:a14="http://schemas.microsoft.com/office/drawing/2010/main" val="0"/>
+                <a14:useLocalDpi xmlns:a14="http://schemas.microsoft.com/office/drawing/2010/main" xmlns="" val="0"/>
               </a:ext>
             </a:extLst>
           </a:blip>
@@ -10989,7 +11047,7 @@
           <a:noFill/>
           <a:extLst>
             <a:ext uri="{909E8E84-426E-40DD-AFC4-6F175D3DCCD1}">
-              <a14:hiddenFill xmlns:a14="http://schemas.microsoft.com/office/drawing/2010/main">
+              <a14:hiddenFill xmlns:a14="http://schemas.microsoft.com/office/drawing/2010/main" xmlns="">
                 <a:solidFill>
                   <a:srgbClr val="FFFFFF"/>
                 </a:solidFill>
@@ -11010,7 +11068,7 @@
           <a:blip r:embed="rId4" cstate="print">
             <a:extLst>
               <a:ext uri="{28A0092B-C50C-407E-A947-70E740481C1C}">
-                <a14:useLocalDpi xmlns:a14="http://schemas.microsoft.com/office/drawing/2010/main" val="0"/>
+                <a14:useLocalDpi xmlns:a14="http://schemas.microsoft.com/office/drawing/2010/main" xmlns="" val="0"/>
               </a:ext>
             </a:extLst>
           </a:blip>
@@ -11030,7 +11088,7 @@
           <a:noFill/>
           <a:extLst>
             <a:ext uri="{909E8E84-426E-40DD-AFC4-6F175D3DCCD1}">
-              <a14:hiddenFill xmlns:a14="http://schemas.microsoft.com/office/drawing/2010/main">
+              <a14:hiddenFill xmlns:a14="http://schemas.microsoft.com/office/drawing/2010/main" xmlns="">
                 <a:solidFill>
                   <a:srgbClr val="FFFFFF"/>
                 </a:solidFill>

</xml_diff>